<commit_message>
[master] added few theory lessons
</commit_message>
<xml_diff>
--- a/theory_03-wearable_sensors_part_2/theory_03-wearable_sensors_part_2.pptx
+++ b/theory_03-wearable_sensors_part_2/theory_03-wearable_sensors_part_2.pptx
@@ -5,7 +5,7 @@
     <p:sldMasterId id="2147483648" r:id="rId1"/>
   </p:sldMasterIdLst>
   <p:notesMasterIdLst>
-    <p:notesMasterId r:id="rId38"/>
+    <p:notesMasterId r:id="rId37"/>
   </p:notesMasterIdLst>
   <p:sldIdLst>
     <p:sldId id="256" r:id="rId2"/>
@@ -43,7 +43,6 @@
     <p:sldId id="309" r:id="rId34"/>
     <p:sldId id="310" r:id="rId35"/>
     <p:sldId id="274" r:id="rId36"/>
-    <p:sldId id="303" r:id="rId37"/>
   </p:sldIdLst>
   <p:sldSz cx="12192000" cy="6858000"/>
   <p:notesSz cx="6858000" cy="9144000"/>
@@ -232,7 +231,7 @@
           <a:p>
             <a:fld id="{5BDD61AD-5ABE-41AD-B3EF-A04A3105339F}" type="datetimeFigureOut">
               <a:rPr lang="en-GB" smtClean="0"/>
-              <a:t>30/01/2024</a:t>
+              <a:t>02/02/2024</a:t>
             </a:fld>
             <a:endParaRPr lang="en-GB"/>
           </a:p>
@@ -4050,8 +4049,8 @@
           </a:p>
         </p:txBody>
       </p:sp>
-      <mc:AlternateContent xmlns:mc="http://schemas.openxmlformats.org/markup-compatibility/2006">
-        <mc:Choice xmlns:a14="http://schemas.microsoft.com/office/drawing/2010/main" Requires="a14">
+      <mc:AlternateContent xmlns:mc="http://schemas.openxmlformats.org/markup-compatibility/2006" xmlns:a14="http://schemas.microsoft.com/office/drawing/2010/main">
+        <mc:Choice Requires="a14">
           <p:sp>
             <p:nvSpPr>
               <p:cNvPr id="3" name="Segnaposto contenuto 2"/>
@@ -4194,7 +4193,7 @@
             </p:txBody>
           </p:sp>
         </mc:Choice>
-        <mc:Fallback>
+        <mc:Fallback xmlns="">
           <p:sp>
             <p:nvSpPr>
               <p:cNvPr id="3" name="Segnaposto contenuto 2"/>
@@ -25507,7 +25506,15 @@
           <a:p>
             <a:r>
               <a:rPr lang="en-GB" dirty="0"/>
-              <a:t>Wearable devices require a data transmission systems that wirelessly communicate between the sensing device and the receiver and/or gateway device (it can be the smartphone).</a:t>
+              <a:t>Wearable devices require a data transmission systems that </a:t>
+            </a:r>
+            <a:r>
+              <a:rPr lang="en-GB" b="1" dirty="0"/>
+              <a:t>wirelessly</a:t>
+            </a:r>
+            <a:r>
+              <a:rPr lang="en-GB" dirty="0"/>
+              <a:t> communicate between the sensing device and the receiver and/or gateway device (it can be the smartphone).</a:t>
             </a:r>
           </a:p>
           <a:p>
@@ -25856,1785 +25863,6 @@
       <p:bldP spid="5" grpId="0"/>
     </p:bldLst>
   </p:timing>
-</p:sld>
-</file>
-
-<file path=ppt/slides/slide36.xml><?xml version="1.0" encoding="utf-8"?>
-<p:sld xmlns:a="http://schemas.openxmlformats.org/drawingml/2006/main" xmlns:r="http://schemas.openxmlformats.org/officeDocument/2006/relationships" xmlns:p="http://schemas.openxmlformats.org/presentationml/2006/main">
-  <p:cSld>
-    <p:spTree>
-      <p:nvGrpSpPr>
-        <p:cNvPr id="1" name=""/>
-        <p:cNvGrpSpPr/>
-        <p:nvPr/>
-      </p:nvGrpSpPr>
-      <p:grpSpPr>
-        <a:xfrm>
-          <a:off x="0" y="0"/>
-          <a:ext cx="0" cy="0"/>
-          <a:chOff x="0" y="0"/>
-          <a:chExt cx="0" cy="0"/>
-        </a:xfrm>
-      </p:grpSpPr>
-      <p:sp>
-        <p:nvSpPr>
-          <p:cNvPr id="2" name="Titolo 1"/>
-          <p:cNvSpPr>
-            <a:spLocks noGrp="1"/>
-          </p:cNvSpPr>
-          <p:nvPr>
-            <p:ph type="title"/>
-          </p:nvPr>
-        </p:nvSpPr>
-        <p:spPr/>
-        <p:txBody>
-          <a:bodyPr>
-            <a:normAutofit/>
-          </a:bodyPr>
-          <a:lstStyle/>
-          <a:p>
-            <a:r>
-              <a:rPr lang="en-US" dirty="0"/>
-              <a:t>The architecture of wearable </a:t>
-            </a:r>
-            <a:r>
-              <a:rPr lang="en-US" dirty="0" err="1"/>
-              <a:t>IoT</a:t>
-            </a:r>
-            <a:r>
-              <a:rPr lang="en-US" dirty="0"/>
-              <a:t> systems</a:t>
-            </a:r>
-          </a:p>
-        </p:txBody>
-      </p:sp>
-      <p:sp>
-        <p:nvSpPr>
-          <p:cNvPr id="4" name="Rettangolo arrotondato 3"/>
-          <p:cNvSpPr/>
-          <p:nvPr/>
-        </p:nvSpPr>
-        <p:spPr>
-          <a:xfrm>
-            <a:off x="586154" y="5457092"/>
-            <a:ext cx="10861431" cy="1260000"/>
-          </a:xfrm>
-          <a:prstGeom prst="roundRect">
-            <a:avLst/>
-          </a:prstGeom>
-          <a:noFill/>
-          <a:ln w="38100">
-            <a:solidFill>
-              <a:schemeClr val="accent6">
-                <a:lumMod val="50000"/>
-              </a:schemeClr>
-            </a:solidFill>
-          </a:ln>
-        </p:spPr>
-        <p:style>
-          <a:lnRef idx="2">
-            <a:schemeClr val="accent1">
-              <a:shade val="50000"/>
-            </a:schemeClr>
-          </a:lnRef>
-          <a:fillRef idx="1">
-            <a:schemeClr val="accent1"/>
-          </a:fillRef>
-          <a:effectRef idx="0">
-            <a:schemeClr val="accent1"/>
-          </a:effectRef>
-          <a:fontRef idx="minor">
-            <a:schemeClr val="lt1"/>
-          </a:fontRef>
-        </p:style>
-        <p:txBody>
-          <a:bodyPr rtlCol="0" anchor="ctr"/>
-          <a:lstStyle/>
-          <a:p>
-            <a:pPr algn="ctr"/>
-            <a:endParaRPr lang="en-GB"/>
-          </a:p>
-        </p:txBody>
-      </p:sp>
-      <p:sp>
-        <p:nvSpPr>
-          <p:cNvPr id="5" name="CasellaDiTesto 4"/>
-          <p:cNvSpPr txBox="1"/>
-          <p:nvPr/>
-        </p:nvSpPr>
-        <p:spPr>
-          <a:xfrm>
-            <a:off x="658166" y="5902426"/>
-            <a:ext cx="2620108" cy="369332"/>
-          </a:xfrm>
-          <a:prstGeom prst="rect">
-            <a:avLst/>
-          </a:prstGeom>
-          <a:noFill/>
-        </p:spPr>
-        <p:txBody>
-          <a:bodyPr wrap="square" rtlCol="0">
-            <a:spAutoFit/>
-          </a:bodyPr>
-          <a:lstStyle/>
-          <a:p>
-            <a:r>
-              <a:rPr lang="it-IT" b="1" dirty="0">
-                <a:latin typeface="Palatino Linotype" panose="02040502050505030304" pitchFamily="18" charset="0"/>
-              </a:rPr>
-              <a:t>1. </a:t>
-            </a:r>
-            <a:r>
-              <a:rPr lang="it-IT" b="1" dirty="0" err="1">
-                <a:latin typeface="Palatino Linotype" panose="02040502050505030304" pitchFamily="18" charset="0"/>
-              </a:rPr>
-              <a:t>Sensing</a:t>
-            </a:r>
-            <a:r>
-              <a:rPr lang="it-IT" b="1" dirty="0">
-                <a:latin typeface="Palatino Linotype" panose="02040502050505030304" pitchFamily="18" charset="0"/>
-              </a:rPr>
-              <a:t> </a:t>
-            </a:r>
-            <a:r>
-              <a:rPr lang="it-IT" b="1" dirty="0" err="1">
-                <a:latin typeface="Palatino Linotype" panose="02040502050505030304" pitchFamily="18" charset="0"/>
-              </a:rPr>
-              <a:t>layer</a:t>
-            </a:r>
-            <a:endParaRPr lang="en-GB" b="1" dirty="0">
-              <a:latin typeface="Palatino Linotype" panose="02040502050505030304" pitchFamily="18" charset="0"/>
-            </a:endParaRPr>
-          </a:p>
-        </p:txBody>
-      </p:sp>
-      <p:sp>
-        <p:nvSpPr>
-          <p:cNvPr id="6" name="Rettangolo arrotondato 5"/>
-          <p:cNvSpPr/>
-          <p:nvPr/>
-        </p:nvSpPr>
-        <p:spPr>
-          <a:xfrm>
-            <a:off x="586154" y="4091374"/>
-            <a:ext cx="10861431" cy="1260000"/>
-          </a:xfrm>
-          <a:prstGeom prst="roundRect">
-            <a:avLst/>
-          </a:prstGeom>
-          <a:noFill/>
-          <a:ln w="38100">
-            <a:solidFill>
-              <a:schemeClr val="accent6">
-                <a:lumMod val="75000"/>
-              </a:schemeClr>
-            </a:solidFill>
-          </a:ln>
-        </p:spPr>
-        <p:style>
-          <a:lnRef idx="2">
-            <a:schemeClr val="accent1">
-              <a:shade val="50000"/>
-            </a:schemeClr>
-          </a:lnRef>
-          <a:fillRef idx="1">
-            <a:schemeClr val="accent1"/>
-          </a:fillRef>
-          <a:effectRef idx="0">
-            <a:schemeClr val="accent1"/>
-          </a:effectRef>
-          <a:fontRef idx="minor">
-            <a:schemeClr val="lt1"/>
-          </a:fontRef>
-        </p:style>
-        <p:txBody>
-          <a:bodyPr rtlCol="0" anchor="ctr"/>
-          <a:lstStyle/>
-          <a:p>
-            <a:pPr algn="ctr"/>
-            <a:endParaRPr lang="en-GB"/>
-          </a:p>
-        </p:txBody>
-      </p:sp>
-      <p:sp>
-        <p:nvSpPr>
-          <p:cNvPr id="7" name="CasellaDiTesto 6"/>
-          <p:cNvSpPr txBox="1"/>
-          <p:nvPr/>
-        </p:nvSpPr>
-        <p:spPr>
-          <a:xfrm>
-            <a:off x="658166" y="4536708"/>
-            <a:ext cx="2620108" cy="369332"/>
-          </a:xfrm>
-          <a:prstGeom prst="rect">
-            <a:avLst/>
-          </a:prstGeom>
-          <a:noFill/>
-        </p:spPr>
-        <p:txBody>
-          <a:bodyPr wrap="square" rtlCol="0">
-            <a:spAutoFit/>
-          </a:bodyPr>
-          <a:lstStyle/>
-          <a:p>
-            <a:r>
-              <a:rPr lang="it-IT" b="1" dirty="0">
-                <a:latin typeface="Palatino Linotype" panose="02040502050505030304" pitchFamily="18" charset="0"/>
-              </a:rPr>
-              <a:t>2. Network </a:t>
-            </a:r>
-            <a:r>
-              <a:rPr lang="it-IT" b="1" dirty="0" err="1">
-                <a:latin typeface="Palatino Linotype" panose="02040502050505030304" pitchFamily="18" charset="0"/>
-              </a:rPr>
-              <a:t>layer</a:t>
-            </a:r>
-            <a:endParaRPr lang="en-GB" b="1" dirty="0">
-              <a:latin typeface="Palatino Linotype" panose="02040502050505030304" pitchFamily="18" charset="0"/>
-            </a:endParaRPr>
-          </a:p>
-        </p:txBody>
-      </p:sp>
-      <p:sp>
-        <p:nvSpPr>
-          <p:cNvPr id="8" name="Rettangolo arrotondato 7"/>
-          <p:cNvSpPr/>
-          <p:nvPr/>
-        </p:nvSpPr>
-        <p:spPr>
-          <a:xfrm>
-            <a:off x="586153" y="2719790"/>
-            <a:ext cx="10861431" cy="1260000"/>
-          </a:xfrm>
-          <a:prstGeom prst="roundRect">
-            <a:avLst/>
-          </a:prstGeom>
-          <a:noFill/>
-          <a:ln w="38100">
-            <a:solidFill>
-              <a:schemeClr val="accent6">
-                <a:lumMod val="60000"/>
-                <a:lumOff val="40000"/>
-              </a:schemeClr>
-            </a:solidFill>
-          </a:ln>
-        </p:spPr>
-        <p:style>
-          <a:lnRef idx="2">
-            <a:schemeClr val="accent1">
-              <a:shade val="50000"/>
-            </a:schemeClr>
-          </a:lnRef>
-          <a:fillRef idx="1">
-            <a:schemeClr val="accent1"/>
-          </a:fillRef>
-          <a:effectRef idx="0">
-            <a:schemeClr val="accent1"/>
-          </a:effectRef>
-          <a:fontRef idx="minor">
-            <a:schemeClr val="lt1"/>
-          </a:fontRef>
-        </p:style>
-        <p:txBody>
-          <a:bodyPr rtlCol="0" anchor="ctr"/>
-          <a:lstStyle/>
-          <a:p>
-            <a:pPr algn="ctr"/>
-            <a:endParaRPr lang="en-GB"/>
-          </a:p>
-        </p:txBody>
-      </p:sp>
-      <p:sp>
-        <p:nvSpPr>
-          <p:cNvPr id="9" name="CasellaDiTesto 8"/>
-          <p:cNvSpPr txBox="1"/>
-          <p:nvPr/>
-        </p:nvSpPr>
-        <p:spPr>
-          <a:xfrm>
-            <a:off x="666143" y="3037008"/>
-            <a:ext cx="2804745" cy="646331"/>
-          </a:xfrm>
-          <a:prstGeom prst="rect">
-            <a:avLst/>
-          </a:prstGeom>
-          <a:noFill/>
-        </p:spPr>
-        <p:txBody>
-          <a:bodyPr wrap="square" rtlCol="0">
-            <a:spAutoFit/>
-          </a:bodyPr>
-          <a:lstStyle/>
-          <a:p>
-            <a:r>
-              <a:rPr lang="it-IT" b="1" dirty="0">
-                <a:latin typeface="Palatino Linotype" panose="02040502050505030304" pitchFamily="18" charset="0"/>
-              </a:rPr>
-              <a:t>3. Data </a:t>
-            </a:r>
-            <a:r>
-              <a:rPr lang="it-IT" b="1" dirty="0" err="1">
-                <a:latin typeface="Palatino Linotype" panose="02040502050505030304" pitchFamily="18" charset="0"/>
-              </a:rPr>
-              <a:t>storing</a:t>
-            </a:r>
-            <a:r>
-              <a:rPr lang="it-IT" b="1" dirty="0">
-                <a:latin typeface="Palatino Linotype" panose="02040502050505030304" pitchFamily="18" charset="0"/>
-              </a:rPr>
-              <a:t> and processing </a:t>
-            </a:r>
-            <a:r>
-              <a:rPr lang="it-IT" b="1" dirty="0" err="1">
-                <a:latin typeface="Palatino Linotype" panose="02040502050505030304" pitchFamily="18" charset="0"/>
-              </a:rPr>
-              <a:t>layer</a:t>
-            </a:r>
-            <a:endParaRPr lang="en-GB" b="1" dirty="0">
-              <a:latin typeface="Palatino Linotype" panose="02040502050505030304" pitchFamily="18" charset="0"/>
-            </a:endParaRPr>
-          </a:p>
-        </p:txBody>
-      </p:sp>
-      <p:sp>
-        <p:nvSpPr>
-          <p:cNvPr id="10" name="Rettangolo arrotondato 9"/>
-          <p:cNvSpPr/>
-          <p:nvPr/>
-        </p:nvSpPr>
-        <p:spPr>
-          <a:xfrm>
-            <a:off x="586153" y="1331674"/>
-            <a:ext cx="10796954" cy="1260000"/>
-          </a:xfrm>
-          <a:prstGeom prst="roundRect">
-            <a:avLst/>
-          </a:prstGeom>
-          <a:noFill/>
-          <a:ln w="38100">
-            <a:solidFill>
-              <a:schemeClr val="accent6">
-                <a:lumMod val="40000"/>
-                <a:lumOff val="60000"/>
-              </a:schemeClr>
-            </a:solidFill>
-          </a:ln>
-        </p:spPr>
-        <p:style>
-          <a:lnRef idx="2">
-            <a:schemeClr val="accent1">
-              <a:shade val="50000"/>
-            </a:schemeClr>
-          </a:lnRef>
-          <a:fillRef idx="1">
-            <a:schemeClr val="accent1"/>
-          </a:fillRef>
-          <a:effectRef idx="0">
-            <a:schemeClr val="accent1"/>
-          </a:effectRef>
-          <a:fontRef idx="minor">
-            <a:schemeClr val="lt1"/>
-          </a:fontRef>
-        </p:style>
-        <p:txBody>
-          <a:bodyPr rtlCol="0" anchor="ctr"/>
-          <a:lstStyle/>
-          <a:p>
-            <a:pPr algn="ctr"/>
-            <a:endParaRPr lang="en-GB"/>
-          </a:p>
-        </p:txBody>
-      </p:sp>
-      <p:sp>
-        <p:nvSpPr>
-          <p:cNvPr id="11" name="CasellaDiTesto 10"/>
-          <p:cNvSpPr txBox="1"/>
-          <p:nvPr/>
-        </p:nvSpPr>
-        <p:spPr>
-          <a:xfrm>
-            <a:off x="658166" y="1777008"/>
-            <a:ext cx="2620108" cy="369332"/>
-          </a:xfrm>
-          <a:prstGeom prst="rect">
-            <a:avLst/>
-          </a:prstGeom>
-          <a:noFill/>
-        </p:spPr>
-        <p:txBody>
-          <a:bodyPr wrap="square" rtlCol="0">
-            <a:spAutoFit/>
-          </a:bodyPr>
-          <a:lstStyle/>
-          <a:p>
-            <a:r>
-              <a:rPr lang="it-IT" b="1" dirty="0">
-                <a:latin typeface="Palatino Linotype" panose="02040502050505030304" pitchFamily="18" charset="0"/>
-              </a:rPr>
-              <a:t>4. Application </a:t>
-            </a:r>
-            <a:r>
-              <a:rPr lang="it-IT" b="1" dirty="0" err="1">
-                <a:latin typeface="Palatino Linotype" panose="02040502050505030304" pitchFamily="18" charset="0"/>
-              </a:rPr>
-              <a:t>layer</a:t>
-            </a:r>
-            <a:endParaRPr lang="en-GB" b="1" dirty="0">
-              <a:latin typeface="Palatino Linotype" panose="02040502050505030304" pitchFamily="18" charset="0"/>
-            </a:endParaRPr>
-          </a:p>
-        </p:txBody>
-      </p:sp>
-      <p:sp>
-        <p:nvSpPr>
-          <p:cNvPr id="12" name="CasellaDiTesto 11"/>
-          <p:cNvSpPr txBox="1"/>
-          <p:nvPr/>
-        </p:nvSpPr>
-        <p:spPr>
-          <a:xfrm>
-            <a:off x="3206262" y="1488831"/>
-            <a:ext cx="1453661" cy="369332"/>
-          </a:xfrm>
-          <a:prstGeom prst="rect">
-            <a:avLst/>
-          </a:prstGeom>
-          <a:noFill/>
-        </p:spPr>
-        <p:txBody>
-          <a:bodyPr wrap="square" rtlCol="0">
-            <a:spAutoFit/>
-          </a:bodyPr>
-          <a:lstStyle/>
-          <a:p>
-            <a:r>
-              <a:rPr lang="it-IT" dirty="0">
-                <a:latin typeface="Palatino Linotype" panose="02040502050505030304" pitchFamily="18" charset="0"/>
-              </a:rPr>
-              <a:t>Alerts</a:t>
-            </a:r>
-            <a:endParaRPr lang="en-GB" dirty="0">
-              <a:latin typeface="Palatino Linotype" panose="02040502050505030304" pitchFamily="18" charset="0"/>
-            </a:endParaRPr>
-          </a:p>
-        </p:txBody>
-      </p:sp>
-      <p:sp>
-        <p:nvSpPr>
-          <p:cNvPr id="13" name="CasellaDiTesto 12"/>
-          <p:cNvSpPr txBox="1"/>
-          <p:nvPr/>
-        </p:nvSpPr>
-        <p:spPr>
-          <a:xfrm>
-            <a:off x="4654063" y="1488831"/>
-            <a:ext cx="2344614" cy="369332"/>
-          </a:xfrm>
-          <a:prstGeom prst="rect">
-            <a:avLst/>
-          </a:prstGeom>
-          <a:noFill/>
-        </p:spPr>
-        <p:txBody>
-          <a:bodyPr wrap="square" rtlCol="0">
-            <a:spAutoFit/>
-          </a:bodyPr>
-          <a:lstStyle/>
-          <a:p>
-            <a:r>
-              <a:rPr lang="it-IT" dirty="0" err="1">
-                <a:latin typeface="Palatino Linotype" panose="02040502050505030304" pitchFamily="18" charset="0"/>
-              </a:rPr>
-              <a:t>Decision-support</a:t>
-            </a:r>
-            <a:endParaRPr lang="en-GB" dirty="0">
-              <a:latin typeface="Palatino Linotype" panose="02040502050505030304" pitchFamily="18" charset="0"/>
-            </a:endParaRPr>
-          </a:p>
-        </p:txBody>
-      </p:sp>
-      <p:sp>
-        <p:nvSpPr>
-          <p:cNvPr id="14" name="CasellaDiTesto 13"/>
-          <p:cNvSpPr txBox="1"/>
-          <p:nvPr/>
-        </p:nvSpPr>
-        <p:spPr>
-          <a:xfrm>
-            <a:off x="6998677" y="1488831"/>
-            <a:ext cx="1260231" cy="369332"/>
-          </a:xfrm>
-          <a:prstGeom prst="rect">
-            <a:avLst/>
-          </a:prstGeom>
-          <a:noFill/>
-        </p:spPr>
-        <p:txBody>
-          <a:bodyPr wrap="square" rtlCol="0">
-            <a:spAutoFit/>
-          </a:bodyPr>
-          <a:lstStyle/>
-          <a:p>
-            <a:r>
-              <a:rPr lang="it-IT" dirty="0" err="1">
-                <a:latin typeface="Palatino Linotype" panose="02040502050505030304" pitchFamily="18" charset="0"/>
-              </a:rPr>
-              <a:t>Event</a:t>
-            </a:r>
-            <a:r>
-              <a:rPr lang="it-IT" dirty="0">
-                <a:latin typeface="Palatino Linotype" panose="02040502050505030304" pitchFamily="18" charset="0"/>
-              </a:rPr>
-              <a:t> log</a:t>
-            </a:r>
-            <a:endParaRPr lang="en-GB" dirty="0">
-              <a:latin typeface="Palatino Linotype" panose="02040502050505030304" pitchFamily="18" charset="0"/>
-            </a:endParaRPr>
-          </a:p>
-        </p:txBody>
-      </p:sp>
-      <p:sp>
-        <p:nvSpPr>
-          <p:cNvPr id="15" name="CasellaDiTesto 14"/>
-          <p:cNvSpPr txBox="1"/>
-          <p:nvPr/>
-        </p:nvSpPr>
-        <p:spPr>
-          <a:xfrm>
-            <a:off x="8991601" y="1501647"/>
-            <a:ext cx="2086707" cy="369332"/>
-          </a:xfrm>
-          <a:prstGeom prst="rect">
-            <a:avLst/>
-          </a:prstGeom>
-          <a:noFill/>
-        </p:spPr>
-        <p:txBody>
-          <a:bodyPr wrap="square" rtlCol="0">
-            <a:spAutoFit/>
-          </a:bodyPr>
-          <a:lstStyle/>
-          <a:p>
-            <a:r>
-              <a:rPr lang="it-IT" dirty="0">
-                <a:latin typeface="Palatino Linotype" panose="02040502050505030304" pitchFamily="18" charset="0"/>
-              </a:rPr>
-              <a:t>Self-management</a:t>
-            </a:r>
-            <a:endParaRPr lang="en-GB" dirty="0">
-              <a:latin typeface="Palatino Linotype" panose="02040502050505030304" pitchFamily="18" charset="0"/>
-            </a:endParaRPr>
-          </a:p>
-        </p:txBody>
-      </p:sp>
-      <p:sp>
-        <p:nvSpPr>
-          <p:cNvPr id="16" name="CasellaDiTesto 15"/>
-          <p:cNvSpPr txBox="1"/>
-          <p:nvPr/>
-        </p:nvSpPr>
-        <p:spPr>
-          <a:xfrm>
-            <a:off x="5701662" y="2801335"/>
-            <a:ext cx="1922585" cy="369332"/>
-          </a:xfrm>
-          <a:prstGeom prst="rect">
-            <a:avLst/>
-          </a:prstGeom>
-          <a:noFill/>
-        </p:spPr>
-        <p:txBody>
-          <a:bodyPr wrap="square" rtlCol="0">
-            <a:spAutoFit/>
-          </a:bodyPr>
-          <a:lstStyle/>
-          <a:p>
-            <a:r>
-              <a:rPr lang="it-IT" dirty="0">
-                <a:latin typeface="Palatino Linotype" panose="02040502050505030304" pitchFamily="18" charset="0"/>
-              </a:rPr>
-              <a:t>Data </a:t>
-            </a:r>
-            <a:r>
-              <a:rPr lang="it-IT" dirty="0" err="1">
-                <a:latin typeface="Palatino Linotype" panose="02040502050505030304" pitchFamily="18" charset="0"/>
-              </a:rPr>
-              <a:t>analyses</a:t>
-            </a:r>
-            <a:endParaRPr lang="en-GB" dirty="0">
-              <a:latin typeface="Palatino Linotype" panose="02040502050505030304" pitchFamily="18" charset="0"/>
-            </a:endParaRPr>
-          </a:p>
-        </p:txBody>
-      </p:sp>
-      <p:sp>
-        <p:nvSpPr>
-          <p:cNvPr id="17" name="CasellaDiTesto 16"/>
-          <p:cNvSpPr txBox="1"/>
-          <p:nvPr/>
-        </p:nvSpPr>
-        <p:spPr>
-          <a:xfrm>
-            <a:off x="8302649" y="2811852"/>
-            <a:ext cx="3845171" cy="369332"/>
-          </a:xfrm>
-          <a:prstGeom prst="rect">
-            <a:avLst/>
-          </a:prstGeom>
-          <a:noFill/>
-        </p:spPr>
-        <p:txBody>
-          <a:bodyPr wrap="square" rtlCol="0">
-            <a:spAutoFit/>
-          </a:bodyPr>
-          <a:lstStyle/>
-          <a:p>
-            <a:pPr algn="ctr"/>
-            <a:r>
-              <a:rPr lang="it-IT" dirty="0" err="1">
-                <a:latin typeface="Palatino Linotype" panose="02040502050505030304" pitchFamily="18" charset="0"/>
-              </a:rPr>
-              <a:t>Modeling</a:t>
-            </a:r>
-            <a:r>
-              <a:rPr lang="it-IT" dirty="0">
-                <a:latin typeface="Palatino Linotype" panose="02040502050505030304" pitchFamily="18" charset="0"/>
-              </a:rPr>
-              <a:t> </a:t>
-            </a:r>
-          </a:p>
-        </p:txBody>
-      </p:sp>
-      <p:sp>
-        <p:nvSpPr>
-          <p:cNvPr id="18" name="CasellaDiTesto 17"/>
-          <p:cNvSpPr txBox="1"/>
-          <p:nvPr/>
-        </p:nvSpPr>
-        <p:spPr>
-          <a:xfrm>
-            <a:off x="7527578" y="2808458"/>
-            <a:ext cx="2819399" cy="369332"/>
-          </a:xfrm>
-          <a:prstGeom prst="rect">
-            <a:avLst/>
-          </a:prstGeom>
-          <a:noFill/>
-        </p:spPr>
-        <p:txBody>
-          <a:bodyPr wrap="square" rtlCol="0">
-            <a:spAutoFit/>
-          </a:bodyPr>
-          <a:lstStyle/>
-          <a:p>
-            <a:r>
-              <a:rPr lang="it-IT" dirty="0" err="1">
-                <a:latin typeface="Palatino Linotype" panose="02040502050505030304" pitchFamily="18" charset="0"/>
-              </a:rPr>
-              <a:t>Signal</a:t>
-            </a:r>
-            <a:r>
-              <a:rPr lang="it-IT" dirty="0">
-                <a:latin typeface="Palatino Linotype" panose="02040502050505030304" pitchFamily="18" charset="0"/>
-              </a:rPr>
-              <a:t> processing</a:t>
-            </a:r>
-            <a:endParaRPr lang="en-GB" dirty="0">
-              <a:latin typeface="Palatino Linotype" panose="02040502050505030304" pitchFamily="18" charset="0"/>
-            </a:endParaRPr>
-          </a:p>
-        </p:txBody>
-      </p:sp>
-      <p:sp>
-        <p:nvSpPr>
-          <p:cNvPr id="19" name="CasellaDiTesto 18"/>
-          <p:cNvSpPr txBox="1"/>
-          <p:nvPr/>
-        </p:nvSpPr>
-        <p:spPr>
-          <a:xfrm>
-            <a:off x="2642052" y="4178031"/>
-            <a:ext cx="2442348" cy="369332"/>
-          </a:xfrm>
-          <a:prstGeom prst="rect">
-            <a:avLst/>
-          </a:prstGeom>
-          <a:noFill/>
-        </p:spPr>
-        <p:txBody>
-          <a:bodyPr wrap="square" rtlCol="0">
-            <a:spAutoFit/>
-          </a:bodyPr>
-          <a:lstStyle/>
-          <a:p>
-            <a:pPr algn="ctr"/>
-            <a:r>
-              <a:rPr lang="it-IT" dirty="0">
-                <a:latin typeface="Palatino Linotype" panose="02040502050505030304" pitchFamily="18" charset="0"/>
-              </a:rPr>
-              <a:t>Gateway </a:t>
-            </a:r>
-            <a:r>
-              <a:rPr lang="it-IT" dirty="0" err="1">
-                <a:latin typeface="Palatino Linotype" panose="02040502050505030304" pitchFamily="18" charset="0"/>
-              </a:rPr>
-              <a:t>device</a:t>
-            </a:r>
-            <a:endParaRPr lang="en-GB" dirty="0">
-              <a:latin typeface="Palatino Linotype" panose="02040502050505030304" pitchFamily="18" charset="0"/>
-            </a:endParaRPr>
-          </a:p>
-        </p:txBody>
-      </p:sp>
-      <p:sp>
-        <p:nvSpPr>
-          <p:cNvPr id="20" name="CasellaDiTesto 19"/>
-          <p:cNvSpPr txBox="1"/>
-          <p:nvPr/>
-        </p:nvSpPr>
-        <p:spPr>
-          <a:xfrm>
-            <a:off x="5704075" y="4141499"/>
-            <a:ext cx="1922585" cy="646331"/>
-          </a:xfrm>
-          <a:prstGeom prst="rect">
-            <a:avLst/>
-          </a:prstGeom>
-          <a:noFill/>
-        </p:spPr>
-        <p:txBody>
-          <a:bodyPr wrap="square" rtlCol="0">
-            <a:spAutoFit/>
-          </a:bodyPr>
-          <a:lstStyle/>
-          <a:p>
-            <a:r>
-              <a:rPr lang="it-IT" dirty="0" err="1">
-                <a:latin typeface="Palatino Linotype" panose="02040502050505030304" pitchFamily="18" charset="0"/>
-              </a:rPr>
-              <a:t>WiFi</a:t>
-            </a:r>
-            <a:r>
-              <a:rPr lang="it-IT" dirty="0">
-                <a:latin typeface="Palatino Linotype" panose="02040502050505030304" pitchFamily="18" charset="0"/>
-              </a:rPr>
-              <a:t>, </a:t>
-            </a:r>
-          </a:p>
-          <a:p>
-            <a:r>
-              <a:rPr lang="it-IT" dirty="0">
-                <a:latin typeface="Palatino Linotype" panose="02040502050505030304" pitchFamily="18" charset="0"/>
-              </a:rPr>
-              <a:t>Router </a:t>
-            </a:r>
-            <a:endParaRPr lang="en-GB" dirty="0">
-              <a:latin typeface="Palatino Linotype" panose="02040502050505030304" pitchFamily="18" charset="0"/>
-            </a:endParaRPr>
-          </a:p>
-        </p:txBody>
-      </p:sp>
-      <p:sp>
-        <p:nvSpPr>
-          <p:cNvPr id="22" name="CasellaDiTesto 21"/>
-          <p:cNvSpPr txBox="1"/>
-          <p:nvPr/>
-        </p:nvSpPr>
-        <p:spPr>
-          <a:xfrm>
-            <a:off x="9174823" y="4234017"/>
-            <a:ext cx="1922585" cy="369332"/>
-          </a:xfrm>
-          <a:prstGeom prst="rect">
-            <a:avLst/>
-          </a:prstGeom>
-          <a:noFill/>
-        </p:spPr>
-        <p:txBody>
-          <a:bodyPr wrap="square" rtlCol="0">
-            <a:spAutoFit/>
-          </a:bodyPr>
-          <a:lstStyle/>
-          <a:p>
-            <a:r>
-              <a:rPr lang="it-IT" dirty="0">
-                <a:latin typeface="Palatino Linotype" panose="02040502050505030304" pitchFamily="18" charset="0"/>
-              </a:rPr>
-              <a:t>Internet</a:t>
-            </a:r>
-            <a:endParaRPr lang="en-GB" dirty="0">
-              <a:latin typeface="Palatino Linotype" panose="02040502050505030304" pitchFamily="18" charset="0"/>
-            </a:endParaRPr>
-          </a:p>
-        </p:txBody>
-      </p:sp>
-      <p:sp>
-        <p:nvSpPr>
-          <p:cNvPr id="23" name="CasellaDiTesto 22"/>
-          <p:cNvSpPr txBox="1"/>
-          <p:nvPr/>
-        </p:nvSpPr>
-        <p:spPr>
-          <a:xfrm>
-            <a:off x="6187264" y="5525689"/>
-            <a:ext cx="1541585" cy="369332"/>
-          </a:xfrm>
-          <a:prstGeom prst="rect">
-            <a:avLst/>
-          </a:prstGeom>
-          <a:noFill/>
-        </p:spPr>
-        <p:txBody>
-          <a:bodyPr wrap="square" rtlCol="0">
-            <a:spAutoFit/>
-          </a:bodyPr>
-          <a:lstStyle/>
-          <a:p>
-            <a:r>
-              <a:rPr lang="it-IT" dirty="0" err="1">
-                <a:latin typeface="Palatino Linotype" panose="02040502050505030304" pitchFamily="18" charset="0"/>
-              </a:rPr>
-              <a:t>Sensors</a:t>
-            </a:r>
-            <a:endParaRPr lang="en-GB" sz="2400" dirty="0">
-              <a:latin typeface="Palatino Linotype" panose="02040502050505030304" pitchFamily="18" charset="0"/>
-            </a:endParaRPr>
-          </a:p>
-        </p:txBody>
-      </p:sp>
-      <p:sp>
-        <p:nvSpPr>
-          <p:cNvPr id="24" name="CasellaDiTesto 23"/>
-          <p:cNvSpPr txBox="1"/>
-          <p:nvPr/>
-        </p:nvSpPr>
-        <p:spPr>
-          <a:xfrm>
-            <a:off x="3114146" y="5660879"/>
-            <a:ext cx="2086711" cy="307777"/>
-          </a:xfrm>
-          <a:prstGeom prst="rect">
-            <a:avLst/>
-          </a:prstGeom>
-          <a:noFill/>
-        </p:spPr>
-        <p:txBody>
-          <a:bodyPr wrap="square" rtlCol="0">
-            <a:spAutoFit/>
-          </a:bodyPr>
-          <a:lstStyle/>
-          <a:p>
-            <a:r>
-              <a:rPr lang="it-IT" sz="1400" dirty="0">
-                <a:latin typeface="Palatino Linotype" panose="02040502050505030304" pitchFamily="18" charset="0"/>
-              </a:rPr>
-              <a:t>Activity </a:t>
-            </a:r>
-            <a:r>
-              <a:rPr lang="it-IT" sz="1400" dirty="0" err="1">
-                <a:latin typeface="Palatino Linotype" panose="02040502050505030304" pitchFamily="18" charset="0"/>
-              </a:rPr>
-              <a:t>tracker</a:t>
-            </a:r>
-            <a:endParaRPr lang="en-GB" sz="1400" dirty="0">
-              <a:latin typeface="Palatino Linotype" panose="02040502050505030304" pitchFamily="18" charset="0"/>
-            </a:endParaRPr>
-          </a:p>
-        </p:txBody>
-      </p:sp>
-      <p:sp>
-        <p:nvSpPr>
-          <p:cNvPr id="25" name="CasellaDiTesto 24"/>
-          <p:cNvSpPr txBox="1"/>
-          <p:nvPr/>
-        </p:nvSpPr>
-        <p:spPr>
-          <a:xfrm>
-            <a:off x="5068973" y="6332950"/>
-            <a:ext cx="2086711" cy="307777"/>
-          </a:xfrm>
-          <a:prstGeom prst="rect">
-            <a:avLst/>
-          </a:prstGeom>
-          <a:noFill/>
-        </p:spPr>
-        <p:txBody>
-          <a:bodyPr wrap="square" rtlCol="0">
-            <a:spAutoFit/>
-          </a:bodyPr>
-          <a:lstStyle/>
-          <a:p>
-            <a:r>
-              <a:rPr lang="it-IT" sz="1400" dirty="0">
-                <a:latin typeface="Palatino Linotype" panose="02040502050505030304" pitchFamily="18" charset="0"/>
-              </a:rPr>
-              <a:t>Blood pressure </a:t>
-            </a:r>
-            <a:r>
-              <a:rPr lang="it-IT" sz="1400" dirty="0" err="1">
-                <a:latin typeface="Palatino Linotype" panose="02040502050505030304" pitchFamily="18" charset="0"/>
-              </a:rPr>
-              <a:t>sensor</a:t>
-            </a:r>
-            <a:endParaRPr lang="en-GB" sz="1400" dirty="0">
-              <a:latin typeface="Palatino Linotype" panose="02040502050505030304" pitchFamily="18" charset="0"/>
-            </a:endParaRPr>
-          </a:p>
-        </p:txBody>
-      </p:sp>
-      <p:sp>
-        <p:nvSpPr>
-          <p:cNvPr id="26" name="CasellaDiTesto 25"/>
-          <p:cNvSpPr txBox="1"/>
-          <p:nvPr/>
-        </p:nvSpPr>
-        <p:spPr>
-          <a:xfrm>
-            <a:off x="7728849" y="5701229"/>
-            <a:ext cx="2086711" cy="307777"/>
-          </a:xfrm>
-          <a:prstGeom prst="rect">
-            <a:avLst/>
-          </a:prstGeom>
-          <a:noFill/>
-        </p:spPr>
-        <p:txBody>
-          <a:bodyPr wrap="square" rtlCol="0">
-            <a:spAutoFit/>
-          </a:bodyPr>
-          <a:lstStyle/>
-          <a:p>
-            <a:r>
-              <a:rPr lang="it-IT" sz="1400" dirty="0">
-                <a:latin typeface="Palatino Linotype" panose="02040502050505030304" pitchFamily="18" charset="0"/>
-              </a:rPr>
-              <a:t>ECG </a:t>
-            </a:r>
-            <a:r>
-              <a:rPr lang="it-IT" sz="1400" dirty="0" err="1">
-                <a:latin typeface="Palatino Linotype" panose="02040502050505030304" pitchFamily="18" charset="0"/>
-              </a:rPr>
-              <a:t>sensor</a:t>
-            </a:r>
-            <a:endParaRPr lang="en-GB" sz="1400" dirty="0">
-              <a:latin typeface="Palatino Linotype" panose="02040502050505030304" pitchFamily="18" charset="0"/>
-            </a:endParaRPr>
-          </a:p>
-        </p:txBody>
-      </p:sp>
-      <p:sp>
-        <p:nvSpPr>
-          <p:cNvPr id="27" name="CasellaDiTesto 26"/>
-          <p:cNvSpPr txBox="1"/>
-          <p:nvPr/>
-        </p:nvSpPr>
-        <p:spPr>
-          <a:xfrm>
-            <a:off x="9709775" y="6332949"/>
-            <a:ext cx="2086711" cy="307777"/>
-          </a:xfrm>
-          <a:prstGeom prst="rect">
-            <a:avLst/>
-          </a:prstGeom>
-          <a:noFill/>
-        </p:spPr>
-        <p:txBody>
-          <a:bodyPr wrap="square" rtlCol="0">
-            <a:spAutoFit/>
-          </a:bodyPr>
-          <a:lstStyle/>
-          <a:p>
-            <a:r>
-              <a:rPr lang="it-IT" sz="1400" dirty="0" err="1">
-                <a:latin typeface="Palatino Linotype" panose="02040502050505030304" pitchFamily="18" charset="0"/>
-              </a:rPr>
-              <a:t>Glucose</a:t>
-            </a:r>
-            <a:r>
-              <a:rPr lang="it-IT" sz="1400" dirty="0">
-                <a:latin typeface="Palatino Linotype" panose="02040502050505030304" pitchFamily="18" charset="0"/>
-              </a:rPr>
-              <a:t> </a:t>
-            </a:r>
-            <a:r>
-              <a:rPr lang="it-IT" sz="1400" dirty="0" err="1">
-                <a:latin typeface="Palatino Linotype" panose="02040502050505030304" pitchFamily="18" charset="0"/>
-              </a:rPr>
-              <a:t>sensor</a:t>
-            </a:r>
-            <a:endParaRPr lang="en-GB" sz="1400" dirty="0">
-              <a:latin typeface="Palatino Linotype" panose="02040502050505030304" pitchFamily="18" charset="0"/>
-            </a:endParaRPr>
-          </a:p>
-        </p:txBody>
-      </p:sp>
-      <p:sp>
-        <p:nvSpPr>
-          <p:cNvPr id="29" name="Nuvola 28"/>
-          <p:cNvSpPr/>
-          <p:nvPr/>
-        </p:nvSpPr>
-        <p:spPr>
-          <a:xfrm>
-            <a:off x="9087036" y="4595118"/>
-            <a:ext cx="1148861" cy="468923"/>
-          </a:xfrm>
-          <a:prstGeom prst="cloud">
-            <a:avLst/>
-          </a:prstGeom>
-        </p:spPr>
-        <p:style>
-          <a:lnRef idx="1">
-            <a:schemeClr val="accent3"/>
-          </a:lnRef>
-          <a:fillRef idx="2">
-            <a:schemeClr val="accent3"/>
-          </a:fillRef>
-          <a:effectRef idx="1">
-            <a:schemeClr val="accent3"/>
-          </a:effectRef>
-          <a:fontRef idx="minor">
-            <a:schemeClr val="dk1"/>
-          </a:fontRef>
-        </p:style>
-        <p:txBody>
-          <a:bodyPr rtlCol="0" anchor="ctr"/>
-          <a:lstStyle/>
-          <a:p>
-            <a:pPr algn="ctr"/>
-            <a:endParaRPr lang="en-GB"/>
-          </a:p>
-        </p:txBody>
-      </p:sp>
-      <p:sp>
-        <p:nvSpPr>
-          <p:cNvPr id="30" name="Freccia bidirezionale orizzontale 29"/>
-          <p:cNvSpPr/>
-          <p:nvPr/>
-        </p:nvSpPr>
-        <p:spPr>
-          <a:xfrm>
-            <a:off x="4317616" y="4744982"/>
-            <a:ext cx="1226738" cy="169194"/>
-          </a:xfrm>
-          <a:prstGeom prst="leftRightArrow">
-            <a:avLst/>
-          </a:prstGeom>
-        </p:spPr>
-        <p:style>
-          <a:lnRef idx="2">
-            <a:schemeClr val="dk1">
-              <a:shade val="50000"/>
-            </a:schemeClr>
-          </a:lnRef>
-          <a:fillRef idx="1">
-            <a:schemeClr val="dk1"/>
-          </a:fillRef>
-          <a:effectRef idx="0">
-            <a:schemeClr val="dk1"/>
-          </a:effectRef>
-          <a:fontRef idx="minor">
-            <a:schemeClr val="lt1"/>
-          </a:fontRef>
-        </p:style>
-        <p:txBody>
-          <a:bodyPr rtlCol="0" anchor="ctr"/>
-          <a:lstStyle/>
-          <a:p>
-            <a:pPr algn="ctr"/>
-            <a:endParaRPr lang="en-GB"/>
-          </a:p>
-        </p:txBody>
-      </p:sp>
-      <p:pic>
-        <p:nvPicPr>
-          <p:cNvPr id="32" name="Immagine 31"/>
-          <p:cNvPicPr>
-            <a:picLocks noChangeAspect="1"/>
-          </p:cNvPicPr>
-          <p:nvPr/>
-        </p:nvPicPr>
-        <p:blipFill rotWithShape="1">
-          <a:blip r:embed="rId2" cstate="print">
-            <a:extLst>
-              <a:ext uri="{28A0092B-C50C-407E-A947-70E740481C1C}">
-                <a14:useLocalDpi xmlns:a14="http://schemas.microsoft.com/office/drawing/2010/main" val="0"/>
-              </a:ext>
-            </a:extLst>
-          </a:blip>
-          <a:srcRect t="13660" b="12302"/>
-          <a:stretch/>
-        </p:blipFill>
-        <p:spPr>
-          <a:xfrm>
-            <a:off x="6568116" y="4163857"/>
-            <a:ext cx="790166" cy="585025"/>
-          </a:xfrm>
-          <a:prstGeom prst="rect">
-            <a:avLst/>
-          </a:prstGeom>
-        </p:spPr>
-      </p:pic>
-      <p:sp>
-        <p:nvSpPr>
-          <p:cNvPr id="34" name="CasellaDiTesto 33"/>
-          <p:cNvSpPr txBox="1"/>
-          <p:nvPr/>
-        </p:nvSpPr>
-        <p:spPr>
-          <a:xfrm>
-            <a:off x="5832653" y="4855596"/>
-            <a:ext cx="751125" cy="369332"/>
-          </a:xfrm>
-          <a:prstGeom prst="rect">
-            <a:avLst/>
-          </a:prstGeom>
-          <a:noFill/>
-        </p:spPr>
-        <p:txBody>
-          <a:bodyPr wrap="square" rtlCol="0">
-            <a:spAutoFit/>
-          </a:bodyPr>
-          <a:lstStyle/>
-          <a:p>
-            <a:r>
-              <a:rPr lang="it-IT" dirty="0">
-                <a:latin typeface="Palatino Linotype" panose="02040502050505030304" pitchFamily="18" charset="0"/>
-              </a:rPr>
-              <a:t>GSM</a:t>
-            </a:r>
-            <a:endParaRPr lang="en-GB" dirty="0">
-              <a:latin typeface="Palatino Linotype" panose="02040502050505030304" pitchFamily="18" charset="0"/>
-            </a:endParaRPr>
-          </a:p>
-        </p:txBody>
-      </p:sp>
-      <p:pic>
-        <p:nvPicPr>
-          <p:cNvPr id="35" name="Immagine 34"/>
-          <p:cNvPicPr>
-            <a:picLocks noChangeAspect="1"/>
-          </p:cNvPicPr>
-          <p:nvPr/>
-        </p:nvPicPr>
-        <p:blipFill rotWithShape="1">
-          <a:blip r:embed="rId3" cstate="print">
-            <a:extLst>
-              <a:ext uri="{28A0092B-C50C-407E-A947-70E740481C1C}">
-                <a14:useLocalDpi xmlns:a14="http://schemas.microsoft.com/office/drawing/2010/main" val="0"/>
-              </a:ext>
-            </a:extLst>
-          </a:blip>
-          <a:srcRect t="2223" b="9488"/>
-          <a:stretch/>
-        </p:blipFill>
-        <p:spPr>
-          <a:xfrm>
-            <a:off x="6721426" y="4783171"/>
-            <a:ext cx="510962" cy="487222"/>
-          </a:xfrm>
-          <a:prstGeom prst="rect">
-            <a:avLst/>
-          </a:prstGeom>
-        </p:spPr>
-      </p:pic>
-      <p:pic>
-        <p:nvPicPr>
-          <p:cNvPr id="36" name="Immagine 35"/>
-          <p:cNvPicPr>
-            <a:picLocks noChangeAspect="1"/>
-          </p:cNvPicPr>
-          <p:nvPr/>
-        </p:nvPicPr>
-        <p:blipFill>
-          <a:blip r:embed="rId4" cstate="print">
-            <a:extLst>
-              <a:ext uri="{28A0092B-C50C-407E-A947-70E740481C1C}">
-                <a14:useLocalDpi xmlns:a14="http://schemas.microsoft.com/office/drawing/2010/main" val="0"/>
-              </a:ext>
-            </a:extLst>
-          </a:blip>
-          <a:stretch>
-            <a:fillRect/>
-          </a:stretch>
-        </p:blipFill>
-        <p:spPr>
-          <a:xfrm>
-            <a:off x="3470888" y="4505560"/>
-            <a:ext cx="791025" cy="791025"/>
-          </a:xfrm>
-          <a:prstGeom prst="rect">
-            <a:avLst/>
-          </a:prstGeom>
-        </p:spPr>
-      </p:pic>
-      <p:pic>
-        <p:nvPicPr>
-          <p:cNvPr id="37" name="Immagine 36"/>
-          <p:cNvPicPr>
-            <a:picLocks noChangeAspect="1"/>
-          </p:cNvPicPr>
-          <p:nvPr/>
-        </p:nvPicPr>
-        <p:blipFill>
-          <a:blip r:embed="rId5" cstate="print">
-            <a:extLst>
-              <a:ext uri="{28A0092B-C50C-407E-A947-70E740481C1C}">
-                <a14:useLocalDpi xmlns:a14="http://schemas.microsoft.com/office/drawing/2010/main" val="0"/>
-              </a:ext>
-            </a:extLst>
-          </a:blip>
-          <a:stretch>
-            <a:fillRect/>
-          </a:stretch>
-        </p:blipFill>
-        <p:spPr>
-          <a:xfrm>
-            <a:off x="3266846" y="1788867"/>
-            <a:ext cx="654524" cy="654524"/>
-          </a:xfrm>
-          <a:prstGeom prst="rect">
-            <a:avLst/>
-          </a:prstGeom>
-        </p:spPr>
-      </p:pic>
-      <p:pic>
-        <p:nvPicPr>
-          <p:cNvPr id="38" name="Immagine 37"/>
-          <p:cNvPicPr>
-            <a:picLocks noChangeAspect="1"/>
-          </p:cNvPicPr>
-          <p:nvPr/>
-        </p:nvPicPr>
-        <p:blipFill rotWithShape="1">
-          <a:blip r:embed="rId6" cstate="print">
-            <a:biLevel thresh="75000"/>
-            <a:extLst>
-              <a:ext uri="{28A0092B-C50C-407E-A947-70E740481C1C}">
-                <a14:useLocalDpi xmlns:a14="http://schemas.microsoft.com/office/drawing/2010/main" val="0"/>
-              </a:ext>
-            </a:extLst>
-          </a:blip>
-          <a:srcRect t="15649" b="14795"/>
-          <a:stretch/>
-        </p:blipFill>
-        <p:spPr>
-          <a:xfrm>
-            <a:off x="3308809" y="5959420"/>
-            <a:ext cx="966237" cy="672070"/>
-          </a:xfrm>
-          <a:prstGeom prst="rect">
-            <a:avLst/>
-          </a:prstGeom>
-        </p:spPr>
-      </p:pic>
-      <p:pic>
-        <p:nvPicPr>
-          <p:cNvPr id="39" name="Immagine 38"/>
-          <p:cNvPicPr>
-            <a:picLocks noChangeAspect="1"/>
-          </p:cNvPicPr>
-          <p:nvPr/>
-        </p:nvPicPr>
-        <p:blipFill rotWithShape="1">
-          <a:blip r:embed="rId7" cstate="print">
-            <a:extLst>
-              <a:ext uri="{28A0092B-C50C-407E-A947-70E740481C1C}">
-                <a14:useLocalDpi xmlns:a14="http://schemas.microsoft.com/office/drawing/2010/main" val="0"/>
-              </a:ext>
-            </a:extLst>
-          </a:blip>
-          <a:srcRect t="13351" b="10889"/>
-          <a:stretch/>
-        </p:blipFill>
-        <p:spPr>
-          <a:xfrm>
-            <a:off x="5261453" y="5725827"/>
-            <a:ext cx="815078" cy="617508"/>
-          </a:xfrm>
-          <a:prstGeom prst="rect">
-            <a:avLst/>
-          </a:prstGeom>
-        </p:spPr>
-      </p:pic>
-      <p:pic>
-        <p:nvPicPr>
-          <p:cNvPr id="40" name="Immagine 39"/>
-          <p:cNvPicPr>
-            <a:picLocks noChangeAspect="1"/>
-          </p:cNvPicPr>
-          <p:nvPr/>
-        </p:nvPicPr>
-        <p:blipFill rotWithShape="1">
-          <a:blip r:embed="rId8" cstate="print">
-            <a:biLevel thresh="75000"/>
-            <a:extLst>
-              <a:ext uri="{28A0092B-C50C-407E-A947-70E740481C1C}">
-                <a14:useLocalDpi xmlns:a14="http://schemas.microsoft.com/office/drawing/2010/main" val="0"/>
-              </a:ext>
-            </a:extLst>
-          </a:blip>
-          <a:srcRect l="20118" t="11966" r="19396" b="26154"/>
-          <a:stretch/>
-        </p:blipFill>
-        <p:spPr>
-          <a:xfrm>
-            <a:off x="7973057" y="5969126"/>
-            <a:ext cx="577215" cy="623737"/>
-          </a:xfrm>
-          <a:prstGeom prst="rect">
-            <a:avLst/>
-          </a:prstGeom>
-        </p:spPr>
-      </p:pic>
-      <p:pic>
-        <p:nvPicPr>
-          <p:cNvPr id="41" name="Immagine 40"/>
-          <p:cNvPicPr>
-            <a:picLocks noChangeAspect="1"/>
-          </p:cNvPicPr>
-          <p:nvPr/>
-        </p:nvPicPr>
-        <p:blipFill rotWithShape="1">
-          <a:blip r:embed="rId9" cstate="print">
-            <a:biLevel thresh="50000"/>
-            <a:extLst>
-              <a:ext uri="{28A0092B-C50C-407E-A947-70E740481C1C}">
-                <a14:useLocalDpi xmlns:a14="http://schemas.microsoft.com/office/drawing/2010/main" val="0"/>
-              </a:ext>
-            </a:extLst>
-          </a:blip>
-          <a:srcRect l="11349" r="13195"/>
-          <a:stretch/>
-        </p:blipFill>
-        <p:spPr>
-          <a:xfrm>
-            <a:off x="9853211" y="5725826"/>
-            <a:ext cx="1175410" cy="594235"/>
-          </a:xfrm>
-          <a:prstGeom prst="rect">
-            <a:avLst/>
-          </a:prstGeom>
-        </p:spPr>
-      </p:pic>
-      <p:pic>
-        <p:nvPicPr>
-          <p:cNvPr id="42" name="Immagine 41"/>
-          <p:cNvPicPr>
-            <a:picLocks noChangeAspect="1"/>
-          </p:cNvPicPr>
-          <p:nvPr/>
-        </p:nvPicPr>
-        <p:blipFill rotWithShape="1">
-          <a:blip r:embed="rId10" cstate="print">
-            <a:extLst>
-              <a:ext uri="{28A0092B-C50C-407E-A947-70E740481C1C}">
-                <a14:useLocalDpi xmlns:a14="http://schemas.microsoft.com/office/drawing/2010/main" val="0"/>
-              </a:ext>
-            </a:extLst>
-          </a:blip>
-          <a:srcRect t="14470"/>
-          <a:stretch/>
-        </p:blipFill>
-        <p:spPr>
-          <a:xfrm>
-            <a:off x="6165335" y="3177790"/>
-            <a:ext cx="738082" cy="631281"/>
-          </a:xfrm>
-          <a:prstGeom prst="rect">
-            <a:avLst/>
-          </a:prstGeom>
-        </p:spPr>
-      </p:pic>
-      <p:pic>
-        <p:nvPicPr>
-          <p:cNvPr id="43" name="Immagine 42"/>
-          <p:cNvPicPr>
-            <a:picLocks noChangeAspect="1"/>
-          </p:cNvPicPr>
-          <p:nvPr/>
-        </p:nvPicPr>
-        <p:blipFill>
-          <a:blip r:embed="rId11" cstate="print">
-            <a:biLevel thresh="75000"/>
-            <a:extLst>
-              <a:ext uri="{28A0092B-C50C-407E-A947-70E740481C1C}">
-                <a14:useLocalDpi xmlns:a14="http://schemas.microsoft.com/office/drawing/2010/main" val="0"/>
-              </a:ext>
-            </a:extLst>
-          </a:blip>
-          <a:stretch>
-            <a:fillRect/>
-          </a:stretch>
-        </p:blipFill>
-        <p:spPr>
-          <a:xfrm>
-            <a:off x="7883204" y="3153651"/>
-            <a:ext cx="1082830" cy="693804"/>
-          </a:xfrm>
-          <a:prstGeom prst="rect">
-            <a:avLst/>
-          </a:prstGeom>
-        </p:spPr>
-      </p:pic>
-      <p:pic>
-        <p:nvPicPr>
-          <p:cNvPr id="44" name="Immagine 43"/>
-          <p:cNvPicPr>
-            <a:picLocks noChangeAspect="1"/>
-          </p:cNvPicPr>
-          <p:nvPr/>
-        </p:nvPicPr>
-        <p:blipFill>
-          <a:blip r:embed="rId12" cstate="print">
-            <a:extLst>
-              <a:ext uri="{28A0092B-C50C-407E-A947-70E740481C1C}">
-                <a14:useLocalDpi xmlns:a14="http://schemas.microsoft.com/office/drawing/2010/main" val="0"/>
-              </a:ext>
-            </a:extLst>
-          </a:blip>
-          <a:stretch>
-            <a:fillRect/>
-          </a:stretch>
-        </p:blipFill>
-        <p:spPr>
-          <a:xfrm>
-            <a:off x="9727043" y="3240823"/>
-            <a:ext cx="1190766" cy="567904"/>
-          </a:xfrm>
-          <a:prstGeom prst="rect">
-            <a:avLst/>
-          </a:prstGeom>
-        </p:spPr>
-      </p:pic>
-      <p:pic>
-        <p:nvPicPr>
-          <p:cNvPr id="45" name="Picture 2"/>
-          <p:cNvPicPr>
-            <a:picLocks noChangeAspect="1" noChangeArrowheads="1"/>
-          </p:cNvPicPr>
-          <p:nvPr/>
-        </p:nvPicPr>
-        <p:blipFill>
-          <a:blip r:embed="rId13" cstate="print">
-            <a:biLevel thresh="75000"/>
-          </a:blip>
-          <a:srcRect l="5016" t="4758" r="50097" b="4943"/>
-          <a:stretch>
-            <a:fillRect/>
-          </a:stretch>
-        </p:blipFill>
-        <p:spPr bwMode="auto">
-          <a:xfrm>
-            <a:off x="5510026" y="1846052"/>
-            <a:ext cx="638548" cy="657936"/>
-          </a:xfrm>
-          <a:prstGeom prst="rect">
-            <a:avLst/>
-          </a:prstGeom>
-          <a:noFill/>
-          <a:ln w="9525">
-            <a:noFill/>
-            <a:miter lim="800000"/>
-            <a:headEnd/>
-            <a:tailEnd/>
-          </a:ln>
-          <a:effectLst/>
-        </p:spPr>
-      </p:pic>
-      <p:pic>
-        <p:nvPicPr>
-          <p:cNvPr id="46" name="Immagine 45"/>
-          <p:cNvPicPr>
-            <a:picLocks noChangeAspect="1"/>
-          </p:cNvPicPr>
-          <p:nvPr/>
-        </p:nvPicPr>
-        <p:blipFill>
-          <a:blip r:embed="rId14" cstate="print">
-            <a:extLst>
-              <a:ext uri="{28A0092B-C50C-407E-A947-70E740481C1C}">
-                <a14:useLocalDpi xmlns:a14="http://schemas.microsoft.com/office/drawing/2010/main" val="0"/>
-              </a:ext>
-            </a:extLst>
-          </a:blip>
-          <a:stretch>
-            <a:fillRect/>
-          </a:stretch>
-        </p:blipFill>
-        <p:spPr>
-          <a:xfrm>
-            <a:off x="4757846" y="1812020"/>
-            <a:ext cx="725623" cy="725623"/>
-          </a:xfrm>
-          <a:prstGeom prst="rect">
-            <a:avLst/>
-          </a:prstGeom>
-        </p:spPr>
-      </p:pic>
-      <p:pic>
-        <p:nvPicPr>
-          <p:cNvPr id="47" name="Immagine 46"/>
-          <p:cNvPicPr>
-            <a:picLocks noChangeAspect="1"/>
-          </p:cNvPicPr>
-          <p:nvPr/>
-        </p:nvPicPr>
-        <p:blipFill rotWithShape="1">
-          <a:blip r:embed="rId15" cstate="print">
-            <a:extLst>
-              <a:ext uri="{28A0092B-C50C-407E-A947-70E740481C1C}">
-                <a14:useLocalDpi xmlns:a14="http://schemas.microsoft.com/office/drawing/2010/main" val="0"/>
-              </a:ext>
-            </a:extLst>
-          </a:blip>
-          <a:srcRect l="28374" t="6540" r="27640"/>
-          <a:stretch/>
-        </p:blipFill>
-        <p:spPr>
-          <a:xfrm>
-            <a:off x="9655162" y="1833686"/>
-            <a:ext cx="423584" cy="722471"/>
-          </a:xfrm>
-          <a:prstGeom prst="rect">
-            <a:avLst/>
-          </a:prstGeom>
-        </p:spPr>
-      </p:pic>
-      <p:pic>
-        <p:nvPicPr>
-          <p:cNvPr id="48" name="Immagine 47"/>
-          <p:cNvPicPr>
-            <a:picLocks noChangeAspect="1"/>
-          </p:cNvPicPr>
-          <p:nvPr/>
-        </p:nvPicPr>
-        <p:blipFill rotWithShape="1">
-          <a:blip r:embed="rId16" cstate="print">
-            <a:duotone>
-              <a:schemeClr val="accent3">
-                <a:shade val="45000"/>
-                <a:satMod val="135000"/>
-              </a:schemeClr>
-              <a:prstClr val="white"/>
-            </a:duotone>
-            <a:extLst>
-              <a:ext uri="{28A0092B-C50C-407E-A947-70E740481C1C}">
-                <a14:useLocalDpi xmlns:a14="http://schemas.microsoft.com/office/drawing/2010/main" val="0"/>
-              </a:ext>
-            </a:extLst>
-          </a:blip>
-          <a:srcRect l="18566" t="16998" r="18567" b="18788"/>
-          <a:stretch/>
-        </p:blipFill>
-        <p:spPr>
-          <a:xfrm>
-            <a:off x="9727043" y="2044594"/>
-            <a:ext cx="291353" cy="198495"/>
-          </a:xfrm>
-          <a:prstGeom prst="rect">
-            <a:avLst/>
-          </a:prstGeom>
-        </p:spPr>
-      </p:pic>
-      <p:sp>
-        <p:nvSpPr>
-          <p:cNvPr id="51" name="Freccia bidirezionale orizzontale 50"/>
-          <p:cNvSpPr/>
-          <p:nvPr/>
-        </p:nvSpPr>
-        <p:spPr>
-          <a:xfrm>
-            <a:off x="7652240" y="4731501"/>
-            <a:ext cx="1226738" cy="169194"/>
-          </a:xfrm>
-          <a:prstGeom prst="leftRightArrow">
-            <a:avLst/>
-          </a:prstGeom>
-        </p:spPr>
-        <p:style>
-          <a:lnRef idx="2">
-            <a:schemeClr val="dk1">
-              <a:shade val="50000"/>
-            </a:schemeClr>
-          </a:lnRef>
-          <a:fillRef idx="1">
-            <a:schemeClr val="dk1"/>
-          </a:fillRef>
-          <a:effectRef idx="0">
-            <a:schemeClr val="dk1"/>
-          </a:effectRef>
-          <a:fontRef idx="minor">
-            <a:schemeClr val="lt1"/>
-          </a:fontRef>
-        </p:style>
-        <p:txBody>
-          <a:bodyPr rtlCol="0" anchor="ctr"/>
-          <a:lstStyle/>
-          <a:p>
-            <a:pPr algn="ctr"/>
-            <a:endParaRPr lang="en-GB"/>
-          </a:p>
-        </p:txBody>
-      </p:sp>
-      <p:pic>
-        <p:nvPicPr>
-          <p:cNvPr id="53" name="Immagine 52"/>
-          <p:cNvPicPr>
-            <a:picLocks noChangeAspect="1"/>
-          </p:cNvPicPr>
-          <p:nvPr/>
-        </p:nvPicPr>
-        <p:blipFill rotWithShape="1">
-          <a:blip r:embed="rId17" cstate="print">
-            <a:biLevel thresh="75000"/>
-            <a:extLst>
-              <a:ext uri="{28A0092B-C50C-407E-A947-70E740481C1C}">
-                <a14:useLocalDpi xmlns:a14="http://schemas.microsoft.com/office/drawing/2010/main" val="0"/>
-              </a:ext>
-            </a:extLst>
-          </a:blip>
-          <a:srcRect l="32956" r="37156" b="37692"/>
-          <a:stretch/>
-        </p:blipFill>
-        <p:spPr>
-          <a:xfrm>
-            <a:off x="7301040" y="1809632"/>
-            <a:ext cx="464960" cy="700322"/>
-          </a:xfrm>
-          <a:prstGeom prst="rect">
-            <a:avLst/>
-          </a:prstGeom>
-        </p:spPr>
-      </p:pic>
-      <p:sp>
-        <p:nvSpPr>
-          <p:cNvPr id="49" name="CasellaDiTesto 48"/>
-          <p:cNvSpPr txBox="1"/>
-          <p:nvPr/>
-        </p:nvSpPr>
-        <p:spPr>
-          <a:xfrm>
-            <a:off x="3692770" y="2801335"/>
-            <a:ext cx="1922585" cy="369332"/>
-          </a:xfrm>
-          <a:prstGeom prst="rect">
-            <a:avLst/>
-          </a:prstGeom>
-          <a:noFill/>
-        </p:spPr>
-        <p:txBody>
-          <a:bodyPr wrap="square" rtlCol="0">
-            <a:spAutoFit/>
-          </a:bodyPr>
-          <a:lstStyle/>
-          <a:p>
-            <a:r>
-              <a:rPr lang="it-IT" dirty="0">
-                <a:latin typeface="Palatino Linotype" panose="02040502050505030304" pitchFamily="18" charset="0"/>
-              </a:rPr>
-              <a:t>Database</a:t>
-            </a:r>
-            <a:endParaRPr lang="en-GB" dirty="0">
-              <a:latin typeface="Palatino Linotype" panose="02040502050505030304" pitchFamily="18" charset="0"/>
-            </a:endParaRPr>
-          </a:p>
-        </p:txBody>
-      </p:sp>
-      <p:pic>
-        <p:nvPicPr>
-          <p:cNvPr id="3" name="Immagine 2"/>
-          <p:cNvPicPr>
-            <a:picLocks noChangeAspect="1"/>
-          </p:cNvPicPr>
-          <p:nvPr/>
-        </p:nvPicPr>
-        <p:blipFill rotWithShape="1">
-          <a:blip r:embed="rId18" cstate="print">
-            <a:biLevel thresh="75000"/>
-            <a:extLst>
-              <a:ext uri="{28A0092B-C50C-407E-A947-70E740481C1C}">
-                <a14:useLocalDpi xmlns:a14="http://schemas.microsoft.com/office/drawing/2010/main" val="0"/>
-              </a:ext>
-            </a:extLst>
-          </a:blip>
-          <a:srcRect t="10794" b="16165"/>
-          <a:stretch/>
-        </p:blipFill>
-        <p:spPr>
-          <a:xfrm>
-            <a:off x="3733874" y="3112824"/>
-            <a:ext cx="1017056" cy="784655"/>
-          </a:xfrm>
-          <a:prstGeom prst="rect">
-            <a:avLst/>
-          </a:prstGeom>
-        </p:spPr>
-      </p:pic>
-      <p:sp>
-        <p:nvSpPr>
-          <p:cNvPr id="21" name="Segnaposto numero diapositiva 20"/>
-          <p:cNvSpPr>
-            <a:spLocks noGrp="1"/>
-          </p:cNvSpPr>
-          <p:nvPr>
-            <p:ph type="sldNum" sz="quarter" idx="12"/>
-          </p:nvPr>
-        </p:nvSpPr>
-        <p:spPr/>
-        <p:txBody>
-          <a:bodyPr/>
-          <a:lstStyle/>
-          <a:p>
-            <a:fld id="{31DE2C5B-556E-47B8-A792-024C2FCA4ACC}" type="slidenum">
-              <a:rPr lang="en-GB" smtClean="0"/>
-              <a:t>36</a:t>
-            </a:fld>
-            <a:endParaRPr lang="en-GB"/>
-          </a:p>
-        </p:txBody>
-      </p:sp>
-      <p:pic>
-        <p:nvPicPr>
-          <p:cNvPr id="31" name="Immagine 30"/>
-          <p:cNvPicPr>
-            <a:picLocks noChangeAspect="1"/>
-          </p:cNvPicPr>
-          <p:nvPr/>
-        </p:nvPicPr>
-        <p:blipFill>
-          <a:blip r:embed="rId19">
-            <a:extLst>
-              <a:ext uri="{28A0092B-C50C-407E-A947-70E740481C1C}">
-                <a14:useLocalDpi xmlns:a14="http://schemas.microsoft.com/office/drawing/2010/main" val="0"/>
-              </a:ext>
-            </a:extLst>
-          </a:blip>
-          <a:stretch>
-            <a:fillRect/>
-          </a:stretch>
-        </p:blipFill>
-        <p:spPr>
-          <a:xfrm>
-            <a:off x="10564134" y="5140064"/>
-            <a:ext cx="1712287" cy="1638712"/>
-          </a:xfrm>
-          <a:prstGeom prst="rect">
-            <a:avLst/>
-          </a:prstGeom>
-        </p:spPr>
-      </p:pic>
-    </p:spTree>
-    <p:extLst>
-      <p:ext uri="{BB962C8B-B14F-4D97-AF65-F5344CB8AC3E}">
-        <p14:creationId xmlns:p14="http://schemas.microsoft.com/office/powerpoint/2010/main" val="483304000"/>
-      </p:ext>
-    </p:extLst>
-  </p:cSld>
-  <p:clrMapOvr>
-    <a:masterClrMapping/>
-  </p:clrMapOvr>
 </p:sld>
 </file>
 

</xml_diff>

<commit_message>
[master] theory almost ready
</commit_message>
<xml_diff>
--- a/theory_03-wearable_sensors_part_2/theory_03-wearable_sensors_part_2.pptx
+++ b/theory_03-wearable_sensors_part_2/theory_03-wearable_sensors_part_2.pptx
@@ -231,7 +231,7 @@
           <a:p>
             <a:fld id="{5BDD61AD-5ABE-41AD-B3EF-A04A3105339F}" type="datetimeFigureOut">
               <a:rPr lang="en-GB" smtClean="0"/>
-              <a:t>02/02/2024</a:t>
+              <a:t>16/02/2024</a:t>
             </a:fld>
             <a:endParaRPr lang="en-GB"/>
           </a:p>
@@ -2431,7 +2431,7 @@
           <a:p>
             <a:r>
               <a:rPr lang="en-US" dirty="0"/>
-              <a:t>Wearable sensors</a:t>
+              <a:t>Wearable sensors – Part 2</a:t>
             </a:r>
           </a:p>
         </p:txBody>

</xml_diff>